<commit_message>
Atualizei a aba de Pessoa Logada
</commit_message>
<xml_diff>
--- a/HLD_projeto_atualizado.pptx.pptx
+++ b/HLD_projeto_atualizado.pptx.pptx
@@ -241,7 +241,7 @@
           <a:p>
             <a:fld id="{77A4C092-4F8E-410F-9575-FD818C52ABA3}" type="datetimeFigureOut">
               <a:rPr lang="pt-BR" smtClean="0"/>
-              <a:t>08/04/2020</a:t>
+              <a:t>30/04/2020</a:t>
             </a:fld>
             <a:endParaRPr lang="pt-BR"/>
           </a:p>
@@ -409,7 +409,7 @@
           <a:p>
             <a:fld id="{77A4C092-4F8E-410F-9575-FD818C52ABA3}" type="datetimeFigureOut">
               <a:rPr lang="pt-BR" smtClean="0"/>
-              <a:t>08/04/2020</a:t>
+              <a:t>30/04/2020</a:t>
             </a:fld>
             <a:endParaRPr lang="pt-BR"/>
           </a:p>
@@ -587,7 +587,7 @@
           <a:p>
             <a:fld id="{77A4C092-4F8E-410F-9575-FD818C52ABA3}" type="datetimeFigureOut">
               <a:rPr lang="pt-BR" smtClean="0"/>
-              <a:t>08/04/2020</a:t>
+              <a:t>30/04/2020</a:t>
             </a:fld>
             <a:endParaRPr lang="pt-BR"/>
           </a:p>
@@ -755,7 +755,7 @@
           <a:p>
             <a:fld id="{77A4C092-4F8E-410F-9575-FD818C52ABA3}" type="datetimeFigureOut">
               <a:rPr lang="pt-BR" smtClean="0"/>
-              <a:t>08/04/2020</a:t>
+              <a:t>30/04/2020</a:t>
             </a:fld>
             <a:endParaRPr lang="pt-BR"/>
           </a:p>
@@ -1000,7 +1000,7 @@
           <a:p>
             <a:fld id="{77A4C092-4F8E-410F-9575-FD818C52ABA3}" type="datetimeFigureOut">
               <a:rPr lang="pt-BR" smtClean="0"/>
-              <a:t>08/04/2020</a:t>
+              <a:t>30/04/2020</a:t>
             </a:fld>
             <a:endParaRPr lang="pt-BR"/>
           </a:p>
@@ -1229,7 +1229,7 @@
           <a:p>
             <a:fld id="{77A4C092-4F8E-410F-9575-FD818C52ABA3}" type="datetimeFigureOut">
               <a:rPr lang="pt-BR" smtClean="0"/>
-              <a:t>08/04/2020</a:t>
+              <a:t>30/04/2020</a:t>
             </a:fld>
             <a:endParaRPr lang="pt-BR"/>
           </a:p>
@@ -1593,7 +1593,7 @@
           <a:p>
             <a:fld id="{77A4C092-4F8E-410F-9575-FD818C52ABA3}" type="datetimeFigureOut">
               <a:rPr lang="pt-BR" smtClean="0"/>
-              <a:t>08/04/2020</a:t>
+              <a:t>30/04/2020</a:t>
             </a:fld>
             <a:endParaRPr lang="pt-BR"/>
           </a:p>
@@ -1710,7 +1710,7 @@
           <a:p>
             <a:fld id="{77A4C092-4F8E-410F-9575-FD818C52ABA3}" type="datetimeFigureOut">
               <a:rPr lang="pt-BR" smtClean="0"/>
-              <a:t>08/04/2020</a:t>
+              <a:t>30/04/2020</a:t>
             </a:fld>
             <a:endParaRPr lang="pt-BR"/>
           </a:p>
@@ -1805,7 +1805,7 @@
           <a:p>
             <a:fld id="{77A4C092-4F8E-410F-9575-FD818C52ABA3}" type="datetimeFigureOut">
               <a:rPr lang="pt-BR" smtClean="0"/>
-              <a:t>08/04/2020</a:t>
+              <a:t>30/04/2020</a:t>
             </a:fld>
             <a:endParaRPr lang="pt-BR"/>
           </a:p>
@@ -2080,7 +2080,7 @@
           <a:p>
             <a:fld id="{77A4C092-4F8E-410F-9575-FD818C52ABA3}" type="datetimeFigureOut">
               <a:rPr lang="pt-BR" smtClean="0"/>
-              <a:t>08/04/2020</a:t>
+              <a:t>30/04/2020</a:t>
             </a:fld>
             <a:endParaRPr lang="pt-BR"/>
           </a:p>
@@ -2332,7 +2332,7 @@
           <a:p>
             <a:fld id="{77A4C092-4F8E-410F-9575-FD818C52ABA3}" type="datetimeFigureOut">
               <a:rPr lang="pt-BR" smtClean="0"/>
-              <a:t>08/04/2020</a:t>
+              <a:t>30/04/2020</a:t>
             </a:fld>
             <a:endParaRPr lang="pt-BR"/>
           </a:p>
@@ -2543,7 +2543,7 @@
           <a:p>
             <a:fld id="{77A4C092-4F8E-410F-9575-FD818C52ABA3}" type="datetimeFigureOut">
               <a:rPr lang="pt-BR" smtClean="0"/>
-              <a:t>08/04/2020</a:t>
+              <a:t>30/04/2020</a:t>
             </a:fld>
             <a:endParaRPr lang="pt-BR"/>
           </a:p>
@@ -3761,6 +3761,41 @@
           </a:p>
         </p:txBody>
       </p:sp>
+      <p:sp>
+        <p:nvSpPr>
+          <p:cNvPr id="2" name="CaixaDeTexto 1">
+            <a:extLst>
+              <a:ext uri="{FF2B5EF4-FFF2-40B4-BE49-F238E27FC236}">
+                <a16:creationId xmlns:a16="http://schemas.microsoft.com/office/drawing/2014/main" id="{7BD41DCE-86A7-436A-9C31-8CCE3729040C}"/>
+              </a:ext>
+            </a:extLst>
+          </p:cNvPr>
+          <p:cNvSpPr txBox="1"/>
+          <p:nvPr/>
+        </p:nvSpPr>
+        <p:spPr>
+          <a:xfrm>
+            <a:off x="11491993" y="-9947"/>
+            <a:ext cx="805912" cy="369332"/>
+          </a:xfrm>
+          <a:prstGeom prst="rect">
+            <a:avLst/>
+          </a:prstGeom>
+          <a:noFill/>
+        </p:spPr>
+        <p:txBody>
+          <a:bodyPr wrap="square" rtlCol="0">
+            <a:spAutoFit/>
+          </a:bodyPr>
+          <a:lstStyle/>
+          <a:p>
+            <a:r>
+              <a:rPr lang="pt-BR" dirty="0"/>
+              <a:t>HLD</a:t>
+            </a:r>
+          </a:p>
+        </p:txBody>
+      </p:sp>
     </p:spTree>
     <p:extLst>
       <p:ext uri="{BB962C8B-B14F-4D97-AF65-F5344CB8AC3E}">

</xml_diff>